<commit_message>
Ajuste em Casos de Uso
Casos de uso ajustado, Clientes, Convenio, Aprovar Orcamento, Marca
</commit_message>
<xml_diff>
--- a/Site/site/documentos/prototipos - V_3.0.pptx
+++ b/Site/site/documentos/prototipos - V_3.0.pptx
@@ -124,7 +124,7 @@
   </p:defaultTextStyle>
   <p:extLst>
     <p:ext uri="{EFAFB233-063F-42B5-8137-9DF3F51BA10A}">
-      <p15:sldGuideLst xmlns:p15="http://schemas.microsoft.com/office/powerpoint/2012/main" xmlns="">
+      <p15:sldGuideLst xmlns:p15="http://schemas.microsoft.com/office/powerpoint/2012/main">
         <p15:guide id="1" orient="horz" pos="2160">
           <p15:clr>
             <a:srgbClr val="A4A3A4"/>
@@ -395,7 +395,7 @@
     </p:spTree>
     <p:extLst>
       <p:ext uri="{BB962C8B-B14F-4D97-AF65-F5344CB8AC3E}">
-        <p14:creationId xmlns:p14="http://schemas.microsoft.com/office/powerpoint/2010/main" xmlns="" val="4032574923"/>
+        <p14:creationId xmlns:p14="http://schemas.microsoft.com/office/powerpoint/2010/main" val="4032574923"/>
       </p:ext>
     </p:extLst>
   </p:cSld>
@@ -572,7 +572,7 @@
     </p:spTree>
     <p:extLst>
       <p:ext uri="{BB962C8B-B14F-4D97-AF65-F5344CB8AC3E}">
-        <p14:creationId xmlns:p14="http://schemas.microsoft.com/office/powerpoint/2010/main" xmlns="" val="1769993173"/>
+        <p14:creationId xmlns:p14="http://schemas.microsoft.com/office/powerpoint/2010/main" val="1769993173"/>
       </p:ext>
     </p:extLst>
   </p:cSld>
@@ -4523,13 +4523,7 @@
               </a:lnSpc>
             </a:pPr>
             <a:r>
-              <a:rPr lang="pt-BR" sz="3200" dirty="0">
-                <a:latin typeface="Calibri"/>
-              </a:rPr>
-              <a:t>Tela de </a:t>
-            </a:r>
-            <a:r>
-              <a:rPr lang="pt-BR" sz="3200" dirty="0" err="1">
+              <a:rPr lang="pt-BR" sz="3200" dirty="0" err="1" smtClean="0">
                 <a:latin typeface="Calibri"/>
               </a:rPr>
               <a:t>login</a:t>
@@ -5028,7 +5022,7 @@
           <p:nvPr>
             <p:extLst>
               <p:ext uri="{D42A27DB-BD31-4B8C-83A1-F6EECF244321}">
-                <p14:modId xmlns:p14="http://schemas.microsoft.com/office/powerpoint/2010/main" xmlns="" val="2968141052"/>
+                <p14:modId xmlns:p14="http://schemas.microsoft.com/office/powerpoint/2010/main" val="2968141052"/>
               </p:ext>
             </p:extLst>
           </p:nvPr>
@@ -5856,7 +5850,7 @@
           <p:nvPr>
             <p:extLst>
               <p:ext uri="{D42A27DB-BD31-4B8C-83A1-F6EECF244321}">
-                <p14:modId xmlns:p14="http://schemas.microsoft.com/office/powerpoint/2010/main" xmlns="" val="2060689164"/>
+                <p14:modId xmlns:p14="http://schemas.microsoft.com/office/powerpoint/2010/main" val="2060689164"/>
               </p:ext>
             </p:extLst>
           </p:nvPr>
@@ -6595,7 +6589,7 @@
     </p:spTree>
     <p:extLst>
       <p:ext uri="{BB962C8B-B14F-4D97-AF65-F5344CB8AC3E}">
-        <p14:creationId xmlns:p14="http://schemas.microsoft.com/office/powerpoint/2010/main" xmlns="" val="1497100592"/>
+        <p14:creationId xmlns:p14="http://schemas.microsoft.com/office/powerpoint/2010/main" val="1497100592"/>
       </p:ext>
     </p:extLst>
   </p:cSld>
@@ -9857,7 +9851,7 @@
         </p:nvSpPr>
         <p:spPr>
           <a:xfrm>
-            <a:off x="457200" y="44624"/>
+            <a:off x="321508" y="42729"/>
             <a:ext cx="8229240" cy="633600"/>
           </a:xfrm>
           <a:prstGeom prst="rect">
@@ -9903,7 +9897,7 @@
         </p:nvSpPr>
         <p:spPr>
           <a:xfrm>
-            <a:off x="539792" y="672264"/>
+            <a:off x="453860" y="639080"/>
             <a:ext cx="2160000" cy="406440"/>
           </a:xfrm>
           <a:prstGeom prst="rect">
@@ -9924,13 +9918,13 @@
               </a:lnSpc>
             </a:pPr>
             <a:r>
-              <a:rPr lang="pt-BR" sz="2400" dirty="0">
+              <a:rPr lang="pt-BR" sz="2400" dirty="0" smtClean="0">
                 <a:solidFill>
                   <a:srgbClr val="000000"/>
                 </a:solidFill>
                 <a:latin typeface="Calibri"/>
               </a:rPr>
-              <a:t>Nome</a:t>
+              <a:t>Código</a:t>
             </a:r>
             <a:endParaRPr sz="2400" dirty="0"/>
           </a:p>
@@ -10115,8 +10109,8 @@
         </p:nvSpPr>
         <p:spPr>
           <a:xfrm>
-            <a:off x="611640" y="1053016"/>
-            <a:ext cx="4536000" cy="215640"/>
+            <a:off x="2210982" y="1078615"/>
+            <a:ext cx="2901017" cy="216389"/>
           </a:xfrm>
           <a:prstGeom prst="rect">
             <a:avLst/>
@@ -10775,6 +10769,88 @@
             <a:endParaRPr sz="2400" dirty="0"/>
           </a:p>
         </p:txBody>
+      </p:sp>
+      <p:sp>
+        <p:nvSpPr>
+          <p:cNvPr id="20" name="CustomShape 2"/>
+          <p:cNvSpPr/>
+          <p:nvPr/>
+        </p:nvSpPr>
+        <p:spPr>
+          <a:xfrm>
+            <a:off x="2142180" y="658423"/>
+            <a:ext cx="2160000" cy="406440"/>
+          </a:xfrm>
+          <a:prstGeom prst="rect">
+            <a:avLst/>
+          </a:prstGeom>
+          <a:noFill/>
+          <a:ln>
+            <a:noFill/>
+          </a:ln>
+        </p:spPr>
+        <p:txBody>
+          <a:bodyPr/>
+          <a:lstStyle/>
+          <a:p>
+            <a:pPr>
+              <a:lnSpc>
+                <a:spcPct val="100000"/>
+              </a:lnSpc>
+            </a:pPr>
+            <a:r>
+              <a:rPr lang="pt-BR" sz="2400" dirty="0">
+                <a:solidFill>
+                  <a:srgbClr val="000000"/>
+                </a:solidFill>
+                <a:latin typeface="Calibri"/>
+              </a:rPr>
+              <a:t>Nome</a:t>
+            </a:r>
+            <a:endParaRPr sz="2400" dirty="0"/>
+          </a:p>
+          <a:p>
+            <a:pPr>
+              <a:lnSpc>
+                <a:spcPct val="100000"/>
+              </a:lnSpc>
+            </a:pPr>
+            <a:endParaRPr sz="2400" dirty="0"/>
+          </a:p>
+          <a:p>
+            <a:pPr>
+              <a:lnSpc>
+                <a:spcPct val="100000"/>
+              </a:lnSpc>
+            </a:pPr>
+            <a:endParaRPr sz="2400" dirty="0"/>
+          </a:p>
+        </p:txBody>
+      </p:sp>
+      <p:sp>
+        <p:nvSpPr>
+          <p:cNvPr id="21" name="CustomShape 6"/>
+          <p:cNvSpPr/>
+          <p:nvPr/>
+        </p:nvSpPr>
+        <p:spPr>
+          <a:xfrm>
+            <a:off x="575773" y="1072641"/>
+            <a:ext cx="1419185" cy="226896"/>
+          </a:xfrm>
+          <a:prstGeom prst="rect">
+            <a:avLst/>
+          </a:prstGeom>
+          <a:solidFill>
+            <a:srgbClr val="FFFFFF"/>
+          </a:solidFill>
+          <a:ln w="25560">
+            <a:solidFill>
+              <a:srgbClr val="000000"/>
+            </a:solidFill>
+            <a:round/>
+          </a:ln>
+        </p:spPr>
       </p:sp>
     </p:spTree>
   </p:cSld>
@@ -10836,7 +10912,7 @@
         </p:nvSpPr>
         <p:spPr>
           <a:xfrm>
-            <a:off x="531720" y="1340640"/>
+            <a:off x="2627820" y="1139869"/>
             <a:ext cx="4104000" cy="251640"/>
           </a:xfrm>
           <a:prstGeom prst="rect">
@@ -10861,7 +10937,7 @@
         </p:nvSpPr>
         <p:spPr>
           <a:xfrm>
-            <a:off x="467544" y="836712"/>
+            <a:off x="2509353" y="671429"/>
             <a:ext cx="4384080" cy="406440"/>
           </a:xfrm>
           <a:prstGeom prst="rect">
@@ -10918,7 +10994,7 @@
         </p:nvSpPr>
         <p:spPr>
           <a:xfrm>
-            <a:off x="531720" y="2133320"/>
+            <a:off x="521376" y="1992689"/>
             <a:ext cx="2023920" cy="215640"/>
           </a:xfrm>
           <a:prstGeom prst="rect">
@@ -10943,7 +11019,7 @@
         </p:nvSpPr>
         <p:spPr>
           <a:xfrm>
-            <a:off x="467544" y="1654408"/>
+            <a:off x="457200" y="1513777"/>
             <a:ext cx="2088000" cy="406440"/>
           </a:xfrm>
           <a:prstGeom prst="rect">
@@ -11045,7 +11121,7 @@
         </p:nvSpPr>
         <p:spPr>
           <a:xfrm>
-            <a:off x="539640" y="2853320"/>
+            <a:off x="529296" y="2712689"/>
             <a:ext cx="2023920" cy="215640"/>
           </a:xfrm>
           <a:prstGeom prst="rect">
@@ -11070,7 +11146,7 @@
         </p:nvSpPr>
         <p:spPr>
           <a:xfrm>
-            <a:off x="467776" y="2374488"/>
+            <a:off x="457432" y="2233857"/>
             <a:ext cx="2232016" cy="406440"/>
           </a:xfrm>
           <a:prstGeom prst="rect">
@@ -11135,7 +11211,7 @@
         </p:nvSpPr>
         <p:spPr>
           <a:xfrm>
-            <a:off x="2843640" y="2853320"/>
+            <a:off x="2833296" y="2712689"/>
             <a:ext cx="1764360" cy="215640"/>
           </a:xfrm>
           <a:prstGeom prst="rect">
@@ -11160,7 +11236,7 @@
         </p:nvSpPr>
         <p:spPr>
           <a:xfrm>
-            <a:off x="2699792" y="2374488"/>
+            <a:off x="457200" y="655664"/>
             <a:ext cx="2880320" cy="406440"/>
           </a:xfrm>
           <a:prstGeom prst="rect">
@@ -11187,7 +11263,7 @@
                 </a:solidFill>
                 <a:latin typeface="Calibri"/>
               </a:rPr>
-              <a:t>Data Validade</a:t>
+              <a:t>Código</a:t>
             </a:r>
             <a:endParaRPr sz="2800" dirty="0"/>
           </a:p>
@@ -11444,6 +11520,96 @@
               <a:t>CANCELAR</a:t>
             </a:r>
             <a:endParaRPr/>
+          </a:p>
+        </p:txBody>
+      </p:sp>
+      <p:sp>
+        <p:nvSpPr>
+          <p:cNvPr id="16" name="CustomShape 8"/>
+          <p:cNvSpPr/>
+          <p:nvPr/>
+        </p:nvSpPr>
+        <p:spPr>
+          <a:xfrm>
+            <a:off x="529296" y="1184372"/>
+            <a:ext cx="1764360" cy="215640"/>
+          </a:xfrm>
+          <a:prstGeom prst="rect">
+            <a:avLst/>
+          </a:prstGeom>
+          <a:solidFill>
+            <a:srgbClr val="FFFFFF"/>
+          </a:solidFill>
+          <a:ln w="25560">
+            <a:solidFill>
+              <a:srgbClr val="000000"/>
+            </a:solidFill>
+            <a:round/>
+          </a:ln>
+        </p:spPr>
+      </p:sp>
+      <p:sp>
+        <p:nvSpPr>
+          <p:cNvPr id="17" name="CustomShape 9"/>
+          <p:cNvSpPr/>
+          <p:nvPr/>
+        </p:nvSpPr>
+        <p:spPr>
+          <a:xfrm>
+            <a:off x="2709394" y="2258579"/>
+            <a:ext cx="2880320" cy="406440"/>
+          </a:xfrm>
+          <a:prstGeom prst="rect">
+            <a:avLst/>
+          </a:prstGeom>
+          <a:noFill/>
+          <a:ln>
+            <a:noFill/>
+          </a:ln>
+        </p:spPr>
+        <p:txBody>
+          <a:bodyPr/>
+          <a:lstStyle/>
+          <a:p>
+            <a:pPr>
+              <a:lnSpc>
+                <a:spcPct val="100000"/>
+              </a:lnSpc>
+            </a:pPr>
+            <a:r>
+              <a:rPr lang="pt-BR" sz="2800" dirty="0" smtClean="0">
+                <a:solidFill>
+                  <a:srgbClr val="000000"/>
+                </a:solidFill>
+                <a:latin typeface="Calibri"/>
+              </a:rPr>
+              <a:t>Data Validade</a:t>
+            </a:r>
+            <a:endParaRPr sz="2800" dirty="0"/>
+          </a:p>
+          <a:p>
+            <a:pPr>
+              <a:lnSpc>
+                <a:spcPct val="100000"/>
+              </a:lnSpc>
+            </a:pPr>
+            <a:endParaRPr sz="2800" dirty="0"/>
+          </a:p>
+          <a:p>
+            <a:pPr>
+              <a:lnSpc>
+                <a:spcPct val="100000"/>
+              </a:lnSpc>
+            </a:pPr>
+            <a:endParaRPr sz="2800" dirty="0"/>
+          </a:p>
+          <a:p>
+            <a:pPr>
+              <a:lnSpc>
+                <a:spcPct val="100000"/>
+              </a:lnSpc>
+            </a:pPr>
+            <a:endParaRPr sz="2800" dirty="0"/>
           </a:p>
         </p:txBody>
       </p:sp>
@@ -13498,7 +13664,7 @@
         </p:nvSpPr>
         <p:spPr>
           <a:xfrm>
-            <a:off x="467544" y="1734711"/>
+            <a:off x="2295531" y="992332"/>
             <a:ext cx="2160000" cy="542161"/>
           </a:xfrm>
           <a:prstGeom prst="rect">
@@ -13555,7 +13721,7 @@
         </p:nvSpPr>
         <p:spPr>
           <a:xfrm>
-            <a:off x="611640" y="2133240"/>
+            <a:off x="2439627" y="1390861"/>
             <a:ext cx="4536000" cy="287648"/>
           </a:xfrm>
           <a:prstGeom prst="rect">
@@ -13982,7 +14148,7 @@
         </p:nvSpPr>
         <p:spPr>
           <a:xfrm>
-            <a:off x="539792" y="2014448"/>
+            <a:off x="2260023" y="1096765"/>
             <a:ext cx="2160000" cy="406440"/>
           </a:xfrm>
           <a:prstGeom prst="rect">
@@ -14039,7 +14205,7 @@
         </p:nvSpPr>
         <p:spPr>
           <a:xfrm>
-            <a:off x="611640" y="2467880"/>
+            <a:off x="2331871" y="1550197"/>
             <a:ext cx="4536000" cy="313048"/>
           </a:xfrm>
           <a:prstGeom prst="rect">
@@ -14116,8 +14282,8 @@
         </p:nvSpPr>
         <p:spPr>
           <a:xfrm>
-            <a:off x="2627784" y="1484784"/>
-            <a:ext cx="4104000" cy="288032"/>
+            <a:off x="2699792" y="1484784"/>
+            <a:ext cx="4031992" cy="288032"/>
           </a:xfrm>
           <a:prstGeom prst="rect">
             <a:avLst/>
@@ -14141,7 +14307,7 @@
         </p:nvSpPr>
         <p:spPr>
           <a:xfrm>
-            <a:off x="2483536" y="1078344"/>
+            <a:off x="2668718" y="1024546"/>
             <a:ext cx="4384080" cy="406440"/>
           </a:xfrm>
           <a:prstGeom prst="rect">

</xml_diff>

<commit_message>
Ajuste de Casos de uso
ajuste de casos de uso
</commit_message>
<xml_diff>
--- a/Site/site/documentos/prototipos - V_3.0.pptx
+++ b/Site/site/documentos/prototipos - V_3.0.pptx
@@ -4885,7 +4885,7 @@
         </p:nvSpPr>
         <p:spPr>
           <a:xfrm>
-            <a:off x="457200" y="-27360"/>
+            <a:off x="457200" y="89863"/>
             <a:ext cx="8229240" cy="849600"/>
           </a:xfrm>
           <a:prstGeom prst="rect">
@@ -5003,15 +5003,10 @@
               </a:lnSpc>
             </a:pPr>
             <a:r>
-              <a:rPr lang="pt-BR">
-                <a:solidFill>
-                  <a:srgbClr val="000000"/>
-                </a:solidFill>
-                <a:latin typeface="Calibri"/>
-              </a:rPr>
-              <a:t>Cancelar</a:t>
-            </a:r>
-            <a:endParaRPr/>
+              <a:rPr lang="pt-BR" smtClean="0"/>
+              <a:t>Reprovar</a:t>
+            </a:r>
+            <a:endParaRPr dirty="0"/>
           </a:p>
         </p:txBody>
       </p:sp>
@@ -5022,14 +5017,14 @@
           <p:nvPr>
             <p:extLst>
               <p:ext uri="{D42A27DB-BD31-4B8C-83A1-F6EECF244321}">
-                <p14:modId xmlns:p14="http://schemas.microsoft.com/office/powerpoint/2010/main" val="2968141052"/>
+                <p14:modId xmlns:p14="http://schemas.microsoft.com/office/powerpoint/2010/main" val="2246381208"/>
               </p:ext>
             </p:extLst>
           </p:nvPr>
         </p:nvGraphicFramePr>
         <p:xfrm>
-          <a:off x="395464" y="1271716"/>
-          <a:ext cx="8208720" cy="2110320"/>
+          <a:off x="508349" y="2285152"/>
+          <a:ext cx="8178092" cy="1986612"/>
         </p:xfrm>
         <a:graphic>
           <a:graphicData uri="http://schemas.openxmlformats.org/drawingml/2006/table">
@@ -5038,13 +5033,13 @@
                 <a:tableStyleId>{D7AC3CCA-C797-4891-BE02-D94E43425B78}</a:tableStyleId>
               </a:tblPr>
               <a:tblGrid>
-                <a:gridCol w="1641600"/>
-                <a:gridCol w="1641600"/>
-                <a:gridCol w="1641600"/>
-                <a:gridCol w="1641600"/>
-                <a:gridCol w="1642320"/>
+                <a:gridCol w="1635475"/>
+                <a:gridCol w="1635475"/>
+                <a:gridCol w="1635475"/>
+                <a:gridCol w="1635475"/>
+                <a:gridCol w="1636192"/>
               </a:tblGrid>
-              <a:tr h="370800">
+              <a:tr h="345504">
                 <a:tc>
                   <a:txBody>
                     <a:bodyPr/>
@@ -5161,7 +5156,7 @@
                   <a:tcPr/>
                 </a:tc>
               </a:tr>
-              <a:tr h="434880">
+              <a:tr h="405213">
                 <a:tc>
                   <a:txBody>
                     <a:bodyPr/>
@@ -5233,7 +5228,7 @@
                   <a:tcPr/>
                 </a:tc>
               </a:tr>
-              <a:tr h="434880">
+              <a:tr h="405213">
                 <a:tc>
                   <a:txBody>
                     <a:bodyPr/>
@@ -5305,7 +5300,7 @@
                   <a:tcPr/>
                 </a:tc>
               </a:tr>
-              <a:tr h="434880">
+              <a:tr h="405213">
                 <a:tc>
                   <a:txBody>
                     <a:bodyPr/>
@@ -5377,13 +5372,13 @@
                   <a:tcPr/>
                 </a:tc>
               </a:tr>
-              <a:tr h="434880">
+              <a:tr h="405213">
                 <a:tc>
                   <a:txBody>
                     <a:bodyPr/>
                     <a:lstStyle/>
                     <a:p>
-                      <a:endParaRPr lang="pt-BR">
+                      <a:endParaRPr lang="pt-BR" dirty="0">
                         <a:solidFill>
                           <a:schemeClr val="tx1"/>
                         </a:solidFill>
@@ -5461,7 +5456,7 @@
         </p:nvSpPr>
         <p:spPr>
           <a:xfrm>
-            <a:off x="5436096" y="3744296"/>
+            <a:off x="4428056" y="4826556"/>
             <a:ext cx="1368152" cy="260768"/>
           </a:xfrm>
           <a:prstGeom prst="rect">
@@ -5486,7 +5481,7 @@
         </p:nvSpPr>
         <p:spPr>
           <a:xfrm>
-            <a:off x="5328000" y="3383936"/>
+            <a:off x="4319960" y="4466196"/>
             <a:ext cx="2088000" cy="406440"/>
           </a:xfrm>
           <a:prstGeom prst="rect">
@@ -5543,7 +5538,7 @@
         </p:nvSpPr>
         <p:spPr>
           <a:xfrm>
-            <a:off x="6976440" y="3744296"/>
+            <a:off x="5968400" y="4826556"/>
             <a:ext cx="1339976" cy="260768"/>
           </a:xfrm>
           <a:prstGeom prst="rect">
@@ -5568,8 +5563,8 @@
         </p:nvSpPr>
         <p:spPr>
           <a:xfrm>
-            <a:off x="6840360" y="3409136"/>
-            <a:ext cx="2088000" cy="406440"/>
+            <a:off x="457200" y="692696"/>
+            <a:ext cx="1738536" cy="406440"/>
           </a:xfrm>
           <a:prstGeom prst="rect">
             <a:avLst/>
@@ -5589,6 +5584,95 @@
               </a:lnSpc>
             </a:pPr>
             <a:r>
+              <a:rPr lang="pt-BR" sz="2000" dirty="0" smtClean="0">
+                <a:solidFill>
+                  <a:srgbClr val="000000"/>
+                </a:solidFill>
+                <a:latin typeface="Calibri"/>
+              </a:rPr>
+              <a:t>Código Cliente</a:t>
+            </a:r>
+          </a:p>
+          <a:p>
+            <a:pPr>
+              <a:lnSpc>
+                <a:spcPct val="100000"/>
+              </a:lnSpc>
+            </a:pPr>
+            <a:endParaRPr sz="2000" dirty="0"/>
+          </a:p>
+          <a:p>
+            <a:pPr>
+              <a:lnSpc>
+                <a:spcPct val="100000"/>
+              </a:lnSpc>
+            </a:pPr>
+            <a:endParaRPr sz="2000" dirty="0"/>
+          </a:p>
+          <a:p>
+            <a:pPr>
+              <a:lnSpc>
+                <a:spcPct val="100000"/>
+              </a:lnSpc>
+            </a:pPr>
+            <a:endParaRPr sz="2000" dirty="0"/>
+          </a:p>
+        </p:txBody>
+      </p:sp>
+      <p:sp>
+        <p:nvSpPr>
+          <p:cNvPr id="10" name="CustomShape 7"/>
+          <p:cNvSpPr/>
+          <p:nvPr/>
+        </p:nvSpPr>
+        <p:spPr>
+          <a:xfrm>
+            <a:off x="629392" y="1108939"/>
+            <a:ext cx="1422328" cy="231829"/>
+          </a:xfrm>
+          <a:prstGeom prst="rect">
+            <a:avLst/>
+          </a:prstGeom>
+          <a:solidFill>
+            <a:srgbClr val="FFFFFF"/>
+          </a:solidFill>
+          <a:ln w="25560">
+            <a:solidFill>
+              <a:srgbClr val="000000"/>
+            </a:solidFill>
+            <a:round/>
+          </a:ln>
+        </p:spPr>
+      </p:sp>
+      <p:sp>
+        <p:nvSpPr>
+          <p:cNvPr id="11" name="CustomShape 8"/>
+          <p:cNvSpPr/>
+          <p:nvPr/>
+        </p:nvSpPr>
+        <p:spPr>
+          <a:xfrm>
+            <a:off x="5850198" y="4408648"/>
+            <a:ext cx="1512168" cy="406440"/>
+          </a:xfrm>
+          <a:prstGeom prst="rect">
+            <a:avLst/>
+          </a:prstGeom>
+          <a:noFill/>
+          <a:ln>
+            <a:noFill/>
+          </a:ln>
+        </p:spPr>
+        <p:txBody>
+          <a:bodyPr/>
+          <a:lstStyle/>
+          <a:p>
+            <a:pPr>
+              <a:lnSpc>
+                <a:spcPct val="100000"/>
+              </a:lnSpc>
+            </a:pPr>
+            <a:r>
               <a:rPr lang="pt-BR" sz="2000" dirty="0">
                 <a:solidFill>
                   <a:srgbClr val="000000"/>
@@ -5616,6 +5700,177 @@
             <a:endParaRPr sz="2000" dirty="0"/>
           </a:p>
         </p:txBody>
+      </p:sp>
+      <p:sp>
+        <p:nvSpPr>
+          <p:cNvPr id="12" name="CustomShape 8"/>
+          <p:cNvSpPr/>
+          <p:nvPr/>
+        </p:nvSpPr>
+        <p:spPr>
+          <a:xfrm>
+            <a:off x="2051720" y="702499"/>
+            <a:ext cx="1738536" cy="406440"/>
+          </a:xfrm>
+          <a:prstGeom prst="rect">
+            <a:avLst/>
+          </a:prstGeom>
+          <a:noFill/>
+          <a:ln>
+            <a:noFill/>
+          </a:ln>
+        </p:spPr>
+        <p:txBody>
+          <a:bodyPr/>
+          <a:lstStyle/>
+          <a:p>
+            <a:pPr>
+              <a:lnSpc>
+                <a:spcPct val="100000"/>
+              </a:lnSpc>
+            </a:pPr>
+            <a:r>
+              <a:rPr lang="pt-BR" sz="2000" dirty="0" smtClean="0">
+                <a:solidFill>
+                  <a:srgbClr val="000000"/>
+                </a:solidFill>
+                <a:latin typeface="Calibri"/>
+              </a:rPr>
+              <a:t>Nome:</a:t>
+            </a:r>
+          </a:p>
+          <a:p>
+            <a:pPr>
+              <a:lnSpc>
+                <a:spcPct val="100000"/>
+              </a:lnSpc>
+            </a:pPr>
+            <a:endParaRPr sz="2000" dirty="0"/>
+          </a:p>
+          <a:p>
+            <a:pPr>
+              <a:lnSpc>
+                <a:spcPct val="100000"/>
+              </a:lnSpc>
+            </a:pPr>
+            <a:endParaRPr sz="2000" dirty="0"/>
+          </a:p>
+          <a:p>
+            <a:pPr>
+              <a:lnSpc>
+                <a:spcPct val="100000"/>
+              </a:lnSpc>
+            </a:pPr>
+            <a:endParaRPr sz="2000" dirty="0"/>
+          </a:p>
+        </p:txBody>
+      </p:sp>
+      <p:sp>
+        <p:nvSpPr>
+          <p:cNvPr id="13" name="CustomShape 7"/>
+          <p:cNvSpPr/>
+          <p:nvPr/>
+        </p:nvSpPr>
+        <p:spPr>
+          <a:xfrm>
+            <a:off x="2223912" y="1118742"/>
+            <a:ext cx="5138454" cy="222027"/>
+          </a:xfrm>
+          <a:prstGeom prst="rect">
+            <a:avLst/>
+          </a:prstGeom>
+          <a:solidFill>
+            <a:srgbClr val="FFFFFF"/>
+          </a:solidFill>
+          <a:ln w="25560">
+            <a:solidFill>
+              <a:srgbClr val="000000"/>
+            </a:solidFill>
+            <a:round/>
+          </a:ln>
+        </p:spPr>
+      </p:sp>
+      <p:sp>
+        <p:nvSpPr>
+          <p:cNvPr id="14" name="CustomShape 8"/>
+          <p:cNvSpPr/>
+          <p:nvPr/>
+        </p:nvSpPr>
+        <p:spPr>
+          <a:xfrm>
+            <a:off x="457200" y="1313113"/>
+            <a:ext cx="1738536" cy="406440"/>
+          </a:xfrm>
+          <a:prstGeom prst="rect">
+            <a:avLst/>
+          </a:prstGeom>
+          <a:noFill/>
+          <a:ln>
+            <a:noFill/>
+          </a:ln>
+        </p:spPr>
+        <p:txBody>
+          <a:bodyPr/>
+          <a:lstStyle/>
+          <a:p>
+            <a:pPr>
+              <a:lnSpc>
+                <a:spcPct val="100000"/>
+              </a:lnSpc>
+            </a:pPr>
+            <a:r>
+              <a:rPr lang="pt-BR" sz="2000" dirty="0" smtClean="0">
+                <a:solidFill>
+                  <a:srgbClr val="000000"/>
+                </a:solidFill>
+                <a:latin typeface="Calibri"/>
+              </a:rPr>
+              <a:t>Orçamento:</a:t>
+            </a:r>
+            <a:endParaRPr sz="2000" dirty="0"/>
+          </a:p>
+          <a:p>
+            <a:pPr>
+              <a:lnSpc>
+                <a:spcPct val="100000"/>
+              </a:lnSpc>
+            </a:pPr>
+            <a:endParaRPr sz="2000" dirty="0"/>
+          </a:p>
+          <a:p>
+            <a:pPr>
+              <a:lnSpc>
+                <a:spcPct val="100000"/>
+              </a:lnSpc>
+            </a:pPr>
+            <a:endParaRPr sz="2000" dirty="0"/>
+          </a:p>
+        </p:txBody>
+      </p:sp>
+      <p:sp>
+        <p:nvSpPr>
+          <p:cNvPr id="15" name="CustomShape 7"/>
+          <p:cNvSpPr/>
+          <p:nvPr/>
+        </p:nvSpPr>
+        <p:spPr>
+          <a:xfrm>
+            <a:off x="629392" y="1729356"/>
+            <a:ext cx="1422328" cy="231829"/>
+          </a:xfrm>
+          <a:prstGeom prst="rect">
+            <a:avLst/>
+          </a:prstGeom>
+          <a:solidFill>
+            <a:srgbClr val="FFFFFF"/>
+          </a:solidFill>
+          <a:ln w="25560">
+            <a:solidFill>
+              <a:srgbClr val="000000"/>
+            </a:solidFill>
+            <a:round/>
+          </a:ln>
+        </p:spPr>
       </p:sp>
     </p:spTree>
   </p:cSld>

</xml_diff>